<commit_message>
Branched to /pierce, began filling in different states for state machine
</commit_message>
<xml_diff>
--- a/final/documentation/cdrTemplate.pptx
+++ b/final/documentation/cdrTemplate.pptx
@@ -261,7 +261,7 @@
           <a:p>
             <a:fld id="{9A4F62FC-3F89-4E32-B15A-3B355D4811EE}" type="datetimeFigureOut">
               <a:rPr lang="en-US" smtClean="0"/>
-              <a:t>4/13/2015</a:t>
+              <a:t>11/15/2015</a:t>
             </a:fld>
             <a:endParaRPr lang="en-US"/>
           </a:p>
@@ -431,7 +431,7 @@
           <a:p>
             <a:fld id="{9A4F62FC-3F89-4E32-B15A-3B355D4811EE}" type="datetimeFigureOut">
               <a:rPr lang="en-US" smtClean="0"/>
-              <a:t>4/13/2015</a:t>
+              <a:t>11/15/2015</a:t>
             </a:fld>
             <a:endParaRPr lang="en-US"/>
           </a:p>
@@ -611,7 +611,7 @@
           <a:p>
             <a:fld id="{9A4F62FC-3F89-4E32-B15A-3B355D4811EE}" type="datetimeFigureOut">
               <a:rPr lang="en-US" smtClean="0"/>
-              <a:t>4/13/2015</a:t>
+              <a:t>11/15/2015</a:t>
             </a:fld>
             <a:endParaRPr lang="en-US"/>
           </a:p>
@@ -781,7 +781,7 @@
           <a:p>
             <a:fld id="{9A4F62FC-3F89-4E32-B15A-3B355D4811EE}" type="datetimeFigureOut">
               <a:rPr lang="en-US" smtClean="0"/>
-              <a:t>4/13/2015</a:t>
+              <a:t>11/15/2015</a:t>
             </a:fld>
             <a:endParaRPr lang="en-US"/>
           </a:p>
@@ -1027,7 +1027,7 @@
           <a:p>
             <a:fld id="{9A4F62FC-3F89-4E32-B15A-3B355D4811EE}" type="datetimeFigureOut">
               <a:rPr lang="en-US" smtClean="0"/>
-              <a:t>4/13/2015</a:t>
+              <a:t>11/15/2015</a:t>
             </a:fld>
             <a:endParaRPr lang="en-US"/>
           </a:p>
@@ -1259,7 +1259,7 @@
           <a:p>
             <a:fld id="{9A4F62FC-3F89-4E32-B15A-3B355D4811EE}" type="datetimeFigureOut">
               <a:rPr lang="en-US" smtClean="0"/>
-              <a:t>4/13/2015</a:t>
+              <a:t>11/15/2015</a:t>
             </a:fld>
             <a:endParaRPr lang="en-US"/>
           </a:p>
@@ -1626,7 +1626,7 @@
           <a:p>
             <a:fld id="{9A4F62FC-3F89-4E32-B15A-3B355D4811EE}" type="datetimeFigureOut">
               <a:rPr lang="en-US" smtClean="0"/>
-              <a:t>4/13/2015</a:t>
+              <a:t>11/15/2015</a:t>
             </a:fld>
             <a:endParaRPr lang="en-US"/>
           </a:p>
@@ -1744,7 +1744,7 @@
           <a:p>
             <a:fld id="{9A4F62FC-3F89-4E32-B15A-3B355D4811EE}" type="datetimeFigureOut">
               <a:rPr lang="en-US" smtClean="0"/>
-              <a:t>4/13/2015</a:t>
+              <a:t>11/15/2015</a:t>
             </a:fld>
             <a:endParaRPr lang="en-US"/>
           </a:p>
@@ -1839,7 +1839,7 @@
           <a:p>
             <a:fld id="{9A4F62FC-3F89-4E32-B15A-3B355D4811EE}" type="datetimeFigureOut">
               <a:rPr lang="en-US" smtClean="0"/>
-              <a:t>4/13/2015</a:t>
+              <a:t>11/15/2015</a:t>
             </a:fld>
             <a:endParaRPr lang="en-US"/>
           </a:p>
@@ -2116,7 +2116,7 @@
           <a:p>
             <a:fld id="{9A4F62FC-3F89-4E32-B15A-3B355D4811EE}" type="datetimeFigureOut">
               <a:rPr lang="en-US" smtClean="0"/>
-              <a:t>4/13/2015</a:t>
+              <a:t>11/15/2015</a:t>
             </a:fld>
             <a:endParaRPr lang="en-US"/>
           </a:p>
@@ -2369,7 +2369,7 @@
           <a:p>
             <a:fld id="{9A4F62FC-3F89-4E32-B15A-3B355D4811EE}" type="datetimeFigureOut">
               <a:rPr lang="en-US" smtClean="0"/>
-              <a:t>4/13/2015</a:t>
+              <a:t>11/15/2015</a:t>
             </a:fld>
             <a:endParaRPr lang="en-US"/>
           </a:p>
@@ -2582,7 +2582,7 @@
           <a:p>
             <a:fld id="{9A4F62FC-3F89-4E32-B15A-3B355D4811EE}" type="datetimeFigureOut">
               <a:rPr lang="en-US" smtClean="0"/>
-              <a:t>4/13/2015</a:t>
+              <a:t>11/15/2015</a:t>
             </a:fld>
             <a:endParaRPr lang="en-US"/>
           </a:p>

</xml_diff>